<commit_message>
Update talk and InitializeTalk.ps1.
</commit_message>
<xml_diff>
--- a/NuGet & MSBuild.pptx
+++ b/NuGet & MSBuild.pptx
@@ -5,19 +5,17 @@
     <p:sldMasterId id="2147483678" r:id="rId1"/>
   </p:sldMasterIdLst>
   <p:notesMasterIdLst>
-    <p:notesMasterId r:id="rId12"/>
+    <p:notesMasterId r:id="rId10"/>
   </p:notesMasterIdLst>
   <p:sldIdLst>
     <p:sldId id="256" r:id="rId2"/>
-    <p:sldId id="257" r:id="rId3"/>
-    <p:sldId id="258" r:id="rId4"/>
-    <p:sldId id="264" r:id="rId5"/>
-    <p:sldId id="265" r:id="rId6"/>
-    <p:sldId id="266" r:id="rId7"/>
-    <p:sldId id="267" r:id="rId8"/>
-    <p:sldId id="262" r:id="rId9"/>
-    <p:sldId id="263" r:id="rId10"/>
-    <p:sldId id="261" r:id="rId11"/>
+    <p:sldId id="264" r:id="rId3"/>
+    <p:sldId id="265" r:id="rId4"/>
+    <p:sldId id="266" r:id="rId5"/>
+    <p:sldId id="267" r:id="rId6"/>
+    <p:sldId id="262" r:id="rId7"/>
+    <p:sldId id="263" r:id="rId8"/>
+    <p:sldId id="261" r:id="rId9"/>
   </p:sldIdLst>
   <p:sldSz cx="12192000" cy="6858000"/>
   <p:notesSz cx="6858000" cy="9144000"/>
@@ -206,7 +204,7 @@
           <a:p>
             <a:fld id="{9CF6FD77-2031-4CD7-AB99-DE7B8AEC61ED}" type="datetimeFigureOut">
               <a:rPr lang="en-GB" smtClean="0"/>
-              <a:t>11/05/2020</a:t>
+              <a:t>18/05/2020</a:t>
             </a:fld>
             <a:endParaRPr lang="en-GB"/>
           </a:p>
@@ -659,7 +657,7 @@
           <a:p>
             <a:fld id="{8A8B8943-5057-4E73-8B12-C64416F80854}" type="datetime1">
               <a:rPr lang="en-US" smtClean="0"/>
-              <a:t>5/11/2020</a:t>
+              <a:t>5/18/2020</a:t>
             </a:fld>
             <a:endParaRPr lang="en-US" dirty="0"/>
           </a:p>
@@ -962,7 +960,7 @@
           <a:p>
             <a:fld id="{9F34CBEB-A1FE-4DC9-90E3-2E1DEF1700B3}" type="datetime1">
               <a:rPr lang="en-US" smtClean="0"/>
-              <a:t>5/11/2020</a:t>
+              <a:t>5/18/2020</a:t>
             </a:fld>
             <a:endParaRPr lang="en-US" dirty="0"/>
           </a:p>
@@ -1160,7 +1158,7 @@
           <a:p>
             <a:fld id="{9F34CBEB-A1FE-4DC9-90E3-2E1DEF1700B3}" type="datetime1">
               <a:rPr lang="en-US" smtClean="0"/>
-              <a:t>5/11/2020</a:t>
+              <a:t>5/18/2020</a:t>
             </a:fld>
             <a:endParaRPr lang="en-US" dirty="0"/>
           </a:p>
@@ -1427,7 +1425,7 @@
           <a:p>
             <a:fld id="{9F34CBEB-A1FE-4DC9-90E3-2E1DEF1700B3}" type="datetime1">
               <a:rPr lang="en-US" smtClean="0"/>
-              <a:t>5/11/2020</a:t>
+              <a:t>5/18/2020</a:t>
             </a:fld>
             <a:endParaRPr lang="en-US" dirty="0"/>
           </a:p>
@@ -1857,7 +1855,7 @@
           <a:p>
             <a:fld id="{9F34CBEB-A1FE-4DC9-90E3-2E1DEF1700B3}" type="datetime1">
               <a:rPr lang="en-US" smtClean="0"/>
-              <a:t>5/11/2020</a:t>
+              <a:t>5/18/2020</a:t>
             </a:fld>
             <a:endParaRPr lang="en-US" dirty="0"/>
           </a:p>
@@ -2400,7 +2398,7 @@
           <a:p>
             <a:fld id="{9F34CBEB-A1FE-4DC9-90E3-2E1DEF1700B3}" type="datetime1">
               <a:rPr lang="en-US" smtClean="0"/>
-              <a:t>5/11/2020</a:t>
+              <a:t>5/18/2020</a:t>
             </a:fld>
             <a:endParaRPr lang="en-US" dirty="0"/>
           </a:p>
@@ -3270,7 +3268,7 @@
           <a:p>
             <a:fld id="{9F34CBEB-A1FE-4DC9-90E3-2E1DEF1700B3}" type="datetime1">
               <a:rPr lang="en-US" smtClean="0"/>
-              <a:t>5/11/2020</a:t>
+              <a:t>5/18/2020</a:t>
             </a:fld>
             <a:endParaRPr lang="en-US" dirty="0"/>
           </a:p>
@@ -3446,7 +3444,7 @@
           <a:p>
             <a:fld id="{8E750E30-E9D9-4926-81C9-63A58BB066E7}" type="datetime1">
               <a:rPr lang="en-US" smtClean="0"/>
-              <a:t>5/11/2020</a:t>
+              <a:t>5/18/2020</a:t>
             </a:fld>
             <a:endParaRPr lang="en-US" dirty="0"/>
           </a:p>
@@ -3634,7 +3632,7 @@
           <a:p>
             <a:fld id="{7445C5E4-7C24-4BE2-97C7-5429FCA4ED76}" type="datetime1">
               <a:rPr lang="en-US" smtClean="0"/>
-              <a:t>5/11/2020</a:t>
+              <a:t>5/18/2020</a:t>
             </a:fld>
             <a:endParaRPr lang="en-US" dirty="0"/>
           </a:p>
@@ -3808,7 +3806,7 @@
           <a:p>
             <a:fld id="{48AC6F45-55AF-4ECA-A542-FEBC47F33725}" type="datetime1">
               <a:rPr lang="en-US" smtClean="0"/>
-              <a:t>5/11/2020</a:t>
+              <a:t>5/18/2020</a:t>
             </a:fld>
             <a:endParaRPr lang="en-US" dirty="0"/>
           </a:p>
@@ -4056,7 +4054,7 @@
           <a:p>
             <a:fld id="{1B5D3BCE-CAE4-48F6-8315-C13817CE93E0}" type="datetime1">
               <a:rPr lang="en-US" smtClean="0"/>
-              <a:t>5/11/2020</a:t>
+              <a:t>5/18/2020</a:t>
             </a:fld>
             <a:endParaRPr lang="en-US" dirty="0"/>
           </a:p>
@@ -4297,7 +4295,7 @@
           <a:p>
             <a:fld id="{D406F96B-C7E8-4C56-A658-5811DCA2D79E}" type="datetime1">
               <a:rPr lang="en-US" smtClean="0"/>
-              <a:t>5/11/2020</a:t>
+              <a:t>5/18/2020</a:t>
             </a:fld>
             <a:endParaRPr lang="en-US" dirty="0"/>
           </a:p>
@@ -4767,7 +4765,7 @@
           <a:p>
             <a:fld id="{FA4741BC-E2A5-4DD5-ABCF-80AD6E2C9FA9}" type="datetime1">
               <a:rPr lang="en-US" smtClean="0"/>
-              <a:t>5/11/2020</a:t>
+              <a:t>5/18/2020</a:t>
             </a:fld>
             <a:endParaRPr lang="en-US" dirty="0"/>
           </a:p>
@@ -4889,7 +4887,7 @@
           <a:p>
             <a:fld id="{AFF23DF9-D18C-463E-B1FD-4DF40F8E1AD1}" type="datetime1">
               <a:rPr lang="en-US" smtClean="0"/>
-              <a:t>5/11/2020</a:t>
+              <a:t>5/18/2020</a:t>
             </a:fld>
             <a:endParaRPr lang="en-US" dirty="0"/>
           </a:p>
@@ -4988,7 +4986,7 @@
           <a:p>
             <a:fld id="{C1DBCFC3-0487-4E33-A41F-A1737810F8CF}" type="datetime1">
               <a:rPr lang="en-US" smtClean="0"/>
-              <a:t>5/11/2020</a:t>
+              <a:t>5/18/2020</a:t>
             </a:fld>
             <a:endParaRPr lang="en-US" dirty="0"/>
           </a:p>
@@ -5247,7 +5245,7 @@
           <a:p>
             <a:fld id="{681B1F1B-6635-4FED-808A-2A7F39BF3701}" type="datetime1">
               <a:rPr lang="en-US" smtClean="0"/>
-              <a:t>5/11/2020</a:t>
+              <a:t>5/18/2020</a:t>
             </a:fld>
             <a:endParaRPr lang="en-US" dirty="0"/>
           </a:p>
@@ -5552,7 +5550,7 @@
           <a:p>
             <a:fld id="{35730482-DFD1-4999-90F1-F49912D27CED}" type="datetime1">
               <a:rPr lang="en-US" smtClean="0"/>
-              <a:t>5/11/2020</a:t>
+              <a:t>5/18/2020</a:t>
             </a:fld>
             <a:endParaRPr lang="en-US" dirty="0"/>
           </a:p>
@@ -5791,7 +5789,7 @@
           <a:p>
             <a:fld id="{9F34CBEB-A1FE-4DC9-90E3-2E1DEF1700B3}" type="datetime1">
               <a:rPr lang="en-US" smtClean="0"/>
-              <a:t>5/11/2020</a:t>
+              <a:t>5/18/2020</a:t>
             </a:fld>
             <a:endParaRPr lang="en-US" dirty="0"/>
           </a:p>
@@ -5894,6 +5892,53 @@
           </a:p>
         </p:txBody>
       </p:sp>
+      <p:pic>
+        <p:nvPicPr>
+          <p:cNvPr id="7" name="Picture 2">
+            <a:extLst>
+              <a:ext uri="{FF2B5EF4-FFF2-40B4-BE49-F238E27FC236}">
+                <a16:creationId xmlns:a16="http://schemas.microsoft.com/office/drawing/2014/main" id="{8CCD6DEE-A19F-46D1-AABE-38B385EF531C}"/>
+              </a:ext>
+            </a:extLst>
+          </p:cNvPr>
+          <p:cNvPicPr>
+            <a:picLocks noChangeAspect="1" noChangeArrowheads="1"/>
+          </p:cNvPicPr>
+          <p:nvPr userDrawn="1"/>
+        </p:nvPicPr>
+        <p:blipFill>
+          <a:blip r:embed="rId19">
+            <a:extLst>
+              <a:ext uri="{28A0092B-C50C-407E-A947-70E740481C1C}">
+                <a14:useLocalDpi xmlns:a14="http://schemas.microsoft.com/office/drawing/2010/main" val="0"/>
+              </a:ext>
+            </a:extLst>
+          </a:blip>
+          <a:srcRect/>
+          <a:stretch>
+            <a:fillRect/>
+          </a:stretch>
+        </p:blipFill>
+        <p:spPr bwMode="auto">
+          <a:xfrm>
+            <a:off x="770719" y="5973516"/>
+            <a:ext cx="184641" cy="184641"/>
+          </a:xfrm>
+          <a:prstGeom prst="rect">
+            <a:avLst/>
+          </a:prstGeom>
+          <a:noFill/>
+          <a:extLst>
+            <a:ext uri="{909E8E84-426E-40DD-AFC4-6F175D3DCCD1}">
+              <a14:hiddenFill xmlns:a14="http://schemas.microsoft.com/office/drawing/2010/main">
+                <a:solidFill>
+                  <a:srgbClr val="FFFFFF"/>
+                </a:solidFill>
+              </a14:hiddenFill>
+            </a:ext>
+          </a:extLst>
+        </p:spPr>
+      </p:pic>
     </p:spTree>
     <p:extLst>
       <p:ext uri="{BB962C8B-B14F-4D97-AF65-F5344CB8AC3E}">
@@ -6559,8 +6604,12 @@
           <a:lstStyle/>
           <a:p>
             <a:r>
-              <a:rPr lang="en-US"/>
-              <a:t>@rubberduckdev</a:t>
+              <a:rPr lang="en-US" dirty="0"/>
+              <a:t>@</a:t>
+            </a:r>
+            <a:r>
+              <a:rPr lang="en-US" dirty="0" err="1"/>
+              <a:t>rubberduckdev</a:t>
             </a:r>
             <a:endParaRPr lang="en-US" dirty="0"/>
           </a:p>
@@ -6579,425 +6628,7 @@
 </p:sld>
 </file>
 
-<file path=ppt/slides/slide10.xml><?xml version="1.0" encoding="utf-8"?>
-<p:sld xmlns:a="http://schemas.openxmlformats.org/drawingml/2006/main" xmlns:r="http://schemas.openxmlformats.org/officeDocument/2006/relationships" xmlns:p="http://schemas.openxmlformats.org/presentationml/2006/main">
-  <p:cSld>
-    <p:spTree>
-      <p:nvGrpSpPr>
-        <p:cNvPr id="1" name=""/>
-        <p:cNvGrpSpPr/>
-        <p:nvPr/>
-      </p:nvGrpSpPr>
-      <p:grpSpPr>
-        <a:xfrm>
-          <a:off x="0" y="0"/>
-          <a:ext cx="0" cy="0"/>
-          <a:chOff x="0" y="0"/>
-          <a:chExt cx="0" cy="0"/>
-        </a:xfrm>
-      </p:grpSpPr>
-      <p:sp>
-        <p:nvSpPr>
-          <p:cNvPr id="2" name="Title 1">
-            <a:extLst>
-              <a:ext uri="{FF2B5EF4-FFF2-40B4-BE49-F238E27FC236}">
-                <a16:creationId xmlns:a16="http://schemas.microsoft.com/office/drawing/2014/main" id="{F1744F26-6427-43BD-8C69-3B4A4F107532}"/>
-              </a:ext>
-            </a:extLst>
-          </p:cNvPr>
-          <p:cNvSpPr>
-            <a:spLocks noGrp="1"/>
-          </p:cNvSpPr>
-          <p:nvPr>
-            <p:ph type="ctrTitle"/>
-          </p:nvPr>
-        </p:nvSpPr>
-        <p:spPr/>
-        <p:txBody>
-          <a:bodyPr/>
-          <a:lstStyle/>
-          <a:p>
-            <a:r>
-              <a:rPr lang="en-US" dirty="0"/>
-              <a:t>Thank you</a:t>
-            </a:r>
-            <a:endParaRPr lang="en-GB" dirty="0"/>
-          </a:p>
-        </p:txBody>
-      </p:sp>
-      <p:sp>
-        <p:nvSpPr>
-          <p:cNvPr id="3" name="Subtitle 2">
-            <a:extLst>
-              <a:ext uri="{FF2B5EF4-FFF2-40B4-BE49-F238E27FC236}">
-                <a16:creationId xmlns:a16="http://schemas.microsoft.com/office/drawing/2014/main" id="{A0907073-DF12-4691-8658-B05FE5E77A8D}"/>
-              </a:ext>
-            </a:extLst>
-          </p:cNvPr>
-          <p:cNvSpPr>
-            <a:spLocks noGrp="1"/>
-          </p:cNvSpPr>
-          <p:nvPr>
-            <p:ph type="subTitle" idx="1"/>
-          </p:nvPr>
-        </p:nvSpPr>
-        <p:spPr>
-          <a:xfrm>
-            <a:off x="2679906" y="3956280"/>
-            <a:ext cx="6831673" cy="404614"/>
-          </a:xfrm>
-        </p:spPr>
-        <p:txBody>
-          <a:bodyPr>
-            <a:normAutofit/>
-          </a:bodyPr>
-          <a:lstStyle/>
-          <a:p>
-            <a:r>
-              <a:rPr lang="en-US" sz="2000" dirty="0"/>
-              <a:t>Thoughts, comments, questions welcome. Here or on twitter.</a:t>
-            </a:r>
-            <a:endParaRPr lang="en-GB" sz="2000" dirty="0"/>
-          </a:p>
-        </p:txBody>
-      </p:sp>
-      <p:sp>
-        <p:nvSpPr>
-          <p:cNvPr id="4" name="Footer Placeholder 3">
-            <a:extLst>
-              <a:ext uri="{FF2B5EF4-FFF2-40B4-BE49-F238E27FC236}">
-                <a16:creationId xmlns:a16="http://schemas.microsoft.com/office/drawing/2014/main" id="{A124BEA5-4BA4-4300-8E4B-966278C5B5C9}"/>
-              </a:ext>
-            </a:extLst>
-          </p:cNvPr>
-          <p:cNvSpPr>
-            <a:spLocks noGrp="1"/>
-          </p:cNvSpPr>
-          <p:nvPr>
-            <p:ph type="ftr" sz="quarter" idx="11"/>
-          </p:nvPr>
-        </p:nvSpPr>
-        <p:spPr/>
-        <p:txBody>
-          <a:bodyPr/>
-          <a:lstStyle/>
-          <a:p>
-            <a:r>
-              <a:rPr lang="en-US"/>
-              <a:t>@rubberduckdev</a:t>
-            </a:r>
-            <a:endParaRPr lang="en-US" dirty="0"/>
-          </a:p>
-        </p:txBody>
-      </p:sp>
-    </p:spTree>
-    <p:extLst>
-      <p:ext uri="{BB962C8B-B14F-4D97-AF65-F5344CB8AC3E}">
-        <p14:creationId xmlns:p14="http://schemas.microsoft.com/office/powerpoint/2010/main" val="1007846012"/>
-      </p:ext>
-    </p:extLst>
-  </p:cSld>
-  <p:clrMapOvr>
-    <a:masterClrMapping/>
-  </p:clrMapOvr>
-</p:sld>
-</file>
-
 <file path=ppt/slides/slide2.xml><?xml version="1.0" encoding="utf-8"?>
-<p:sld xmlns:a="http://schemas.openxmlformats.org/drawingml/2006/main" xmlns:r="http://schemas.openxmlformats.org/officeDocument/2006/relationships" xmlns:p="http://schemas.openxmlformats.org/presentationml/2006/main">
-  <p:cSld>
-    <p:spTree>
-      <p:nvGrpSpPr>
-        <p:cNvPr id="1" name=""/>
-        <p:cNvGrpSpPr/>
-        <p:nvPr/>
-      </p:nvGrpSpPr>
-      <p:grpSpPr>
-        <a:xfrm>
-          <a:off x="0" y="0"/>
-          <a:ext cx="0" cy="0"/>
-          <a:chOff x="0" y="0"/>
-          <a:chExt cx="0" cy="0"/>
-        </a:xfrm>
-      </p:grpSpPr>
-      <p:sp>
-        <p:nvSpPr>
-          <p:cNvPr id="2" name="Title 1">
-            <a:extLst>
-              <a:ext uri="{FF2B5EF4-FFF2-40B4-BE49-F238E27FC236}">
-                <a16:creationId xmlns:a16="http://schemas.microsoft.com/office/drawing/2014/main" id="{0CCFA5E6-00ED-41FC-9299-3805C7B096DA}"/>
-              </a:ext>
-            </a:extLst>
-          </p:cNvPr>
-          <p:cNvSpPr>
-            <a:spLocks noGrp="1"/>
-          </p:cNvSpPr>
-          <p:nvPr>
-            <p:ph type="title"/>
-          </p:nvPr>
-        </p:nvSpPr>
-        <p:spPr/>
-        <p:txBody>
-          <a:bodyPr/>
-          <a:lstStyle/>
-          <a:p>
-            <a:r>
-              <a:rPr lang="en-US" dirty="0"/>
-              <a:t>Pre-requisites</a:t>
-            </a:r>
-            <a:endParaRPr lang="en-GB" dirty="0"/>
-          </a:p>
-        </p:txBody>
-      </p:sp>
-      <p:sp>
-        <p:nvSpPr>
-          <p:cNvPr id="3" name="Content Placeholder 2">
-            <a:extLst>
-              <a:ext uri="{FF2B5EF4-FFF2-40B4-BE49-F238E27FC236}">
-                <a16:creationId xmlns:a16="http://schemas.microsoft.com/office/drawing/2014/main" id="{7128E6AD-DE32-446C-AFE7-C00318C7C7D6}"/>
-              </a:ext>
-            </a:extLst>
-          </p:cNvPr>
-          <p:cNvSpPr>
-            <a:spLocks noGrp="1"/>
-          </p:cNvSpPr>
-          <p:nvPr>
-            <p:ph idx="1"/>
-          </p:nvPr>
-        </p:nvSpPr>
-        <p:spPr/>
-        <p:txBody>
-          <a:bodyPr/>
-          <a:lstStyle/>
-          <a:p>
-            <a:r>
-              <a:rPr lang="en-GB" dirty="0" err="1"/>
-              <a:t>MSBuild</a:t>
-            </a:r>
-            <a:endParaRPr lang="en-GB" dirty="0"/>
-          </a:p>
-          <a:p>
-            <a:r>
-              <a:rPr lang="en-GB" dirty="0"/>
-              <a:t>Dotnet</a:t>
-            </a:r>
-          </a:p>
-          <a:p>
-            <a:r>
-              <a:rPr lang="en-GB" dirty="0"/>
-              <a:t>NuGet</a:t>
-            </a:r>
-          </a:p>
-        </p:txBody>
-      </p:sp>
-      <p:sp>
-        <p:nvSpPr>
-          <p:cNvPr id="4" name="Footer Placeholder 3">
-            <a:extLst>
-              <a:ext uri="{FF2B5EF4-FFF2-40B4-BE49-F238E27FC236}">
-                <a16:creationId xmlns:a16="http://schemas.microsoft.com/office/drawing/2014/main" id="{881F39BD-E85E-423C-99C2-1ED7149C4FB0}"/>
-              </a:ext>
-            </a:extLst>
-          </p:cNvPr>
-          <p:cNvSpPr>
-            <a:spLocks noGrp="1"/>
-          </p:cNvSpPr>
-          <p:nvPr>
-            <p:ph type="ftr" sz="quarter" idx="11"/>
-          </p:nvPr>
-        </p:nvSpPr>
-        <p:spPr/>
-        <p:txBody>
-          <a:bodyPr/>
-          <a:lstStyle/>
-          <a:p>
-            <a:r>
-              <a:rPr lang="en-US"/>
-              <a:t>@rubberduckdev</a:t>
-            </a:r>
-            <a:endParaRPr lang="en-US" dirty="0"/>
-          </a:p>
-        </p:txBody>
-      </p:sp>
-    </p:spTree>
-    <p:extLst>
-      <p:ext uri="{BB962C8B-B14F-4D97-AF65-F5344CB8AC3E}">
-        <p14:creationId xmlns:p14="http://schemas.microsoft.com/office/powerpoint/2010/main" val="3197501529"/>
-      </p:ext>
-    </p:extLst>
-  </p:cSld>
-  <p:clrMapOvr>
-    <a:masterClrMapping/>
-  </p:clrMapOvr>
-</p:sld>
-</file>
-
-<file path=ppt/slides/slide3.xml><?xml version="1.0" encoding="utf-8"?>
-<p:sld xmlns:a="http://schemas.openxmlformats.org/drawingml/2006/main" xmlns:r="http://schemas.openxmlformats.org/officeDocument/2006/relationships" xmlns:p="http://schemas.openxmlformats.org/presentationml/2006/main">
-  <p:cSld>
-    <p:spTree>
-      <p:nvGrpSpPr>
-        <p:cNvPr id="1" name=""/>
-        <p:cNvGrpSpPr/>
-        <p:nvPr/>
-      </p:nvGrpSpPr>
-      <p:grpSpPr>
-        <a:xfrm>
-          <a:off x="0" y="0"/>
-          <a:ext cx="0" cy="0"/>
-          <a:chOff x="0" y="0"/>
-          <a:chExt cx="0" cy="0"/>
-        </a:xfrm>
-      </p:grpSpPr>
-      <p:sp>
-        <p:nvSpPr>
-          <p:cNvPr id="2" name="Title 1">
-            <a:extLst>
-              <a:ext uri="{FF2B5EF4-FFF2-40B4-BE49-F238E27FC236}">
-                <a16:creationId xmlns:a16="http://schemas.microsoft.com/office/drawing/2014/main" id="{F4EAF768-A849-4BF7-BF0A-E1757ACC67A4}"/>
-              </a:ext>
-            </a:extLst>
-          </p:cNvPr>
-          <p:cNvSpPr>
-            <a:spLocks noGrp="1"/>
-          </p:cNvSpPr>
-          <p:nvPr>
-            <p:ph type="title"/>
-          </p:nvPr>
-        </p:nvSpPr>
-        <p:spPr/>
-        <p:txBody>
-          <a:bodyPr/>
-          <a:lstStyle/>
-          <a:p>
-            <a:r>
-              <a:rPr lang="en-US" dirty="0"/>
-              <a:t>SDK Style </a:t>
-            </a:r>
-            <a:r>
-              <a:rPr lang="en-US" dirty="0" err="1"/>
-              <a:t>csproj</a:t>
-            </a:r>
-            <a:r>
-              <a:rPr lang="en-US" dirty="0"/>
-              <a:t> advantages</a:t>
-            </a:r>
-            <a:endParaRPr lang="en-GB" dirty="0"/>
-          </a:p>
-        </p:txBody>
-      </p:sp>
-      <p:sp>
-        <p:nvSpPr>
-          <p:cNvPr id="3" name="Content Placeholder 2">
-            <a:extLst>
-              <a:ext uri="{FF2B5EF4-FFF2-40B4-BE49-F238E27FC236}">
-                <a16:creationId xmlns:a16="http://schemas.microsoft.com/office/drawing/2014/main" id="{CFA8A365-192D-4567-BDA9-6621756ED7F8}"/>
-              </a:ext>
-            </a:extLst>
-          </p:cNvPr>
-          <p:cNvSpPr>
-            <a:spLocks noGrp="1"/>
-          </p:cNvSpPr>
-          <p:nvPr>
-            <p:ph idx="1"/>
-          </p:nvPr>
-        </p:nvSpPr>
-        <p:spPr/>
-        <p:txBody>
-          <a:bodyPr/>
-          <a:lstStyle/>
-          <a:p>
-            <a:r>
-              <a:rPr lang="en-GB" dirty="0"/>
-              <a:t>Less clutter</a:t>
-            </a:r>
-          </a:p>
-          <a:p>
-            <a:r>
-              <a:rPr lang="en-GB" dirty="0"/>
-              <a:t>Generate NuGet package on build</a:t>
-            </a:r>
-          </a:p>
-          <a:p>
-            <a:r>
-              <a:rPr lang="en-GB" dirty="0"/>
-              <a:t>Toolset improvements</a:t>
-            </a:r>
-          </a:p>
-          <a:p>
-            <a:pPr lvl="1"/>
-            <a:r>
-              <a:rPr lang="en-GB" dirty="0"/>
-              <a:t>Perform dotnet restore or </a:t>
-            </a:r>
-            <a:r>
-              <a:rPr lang="en-GB" dirty="0" err="1"/>
-              <a:t>msbuild</a:t>
-            </a:r>
-            <a:r>
-              <a:rPr lang="en-GB" dirty="0"/>
-              <a:t> /</a:t>
-            </a:r>
-            <a:r>
-              <a:rPr lang="en-GB" dirty="0" err="1"/>
-              <a:t>t:restore</a:t>
-            </a:r>
-            <a:endParaRPr lang="en-GB" dirty="0"/>
-          </a:p>
-          <a:p>
-            <a:r>
-              <a:rPr lang="en-GB" dirty="0"/>
-              <a:t>Auto reload</a:t>
-            </a:r>
-          </a:p>
-          <a:p>
-            <a:endParaRPr lang="en-GB" dirty="0"/>
-          </a:p>
-        </p:txBody>
-      </p:sp>
-      <p:sp>
-        <p:nvSpPr>
-          <p:cNvPr id="4" name="Footer Placeholder 3">
-            <a:extLst>
-              <a:ext uri="{FF2B5EF4-FFF2-40B4-BE49-F238E27FC236}">
-                <a16:creationId xmlns:a16="http://schemas.microsoft.com/office/drawing/2014/main" id="{CE0E6B61-0BA8-4655-BBAB-A44CD2ADE221}"/>
-              </a:ext>
-            </a:extLst>
-          </p:cNvPr>
-          <p:cNvSpPr>
-            <a:spLocks noGrp="1"/>
-          </p:cNvSpPr>
-          <p:nvPr>
-            <p:ph type="ftr" sz="quarter" idx="11"/>
-          </p:nvPr>
-        </p:nvSpPr>
-        <p:spPr/>
-        <p:txBody>
-          <a:bodyPr/>
-          <a:lstStyle/>
-          <a:p>
-            <a:r>
-              <a:rPr lang="en-US"/>
-              <a:t>@rubberduckdev</a:t>
-            </a:r>
-            <a:endParaRPr lang="en-US" dirty="0"/>
-          </a:p>
-        </p:txBody>
-      </p:sp>
-    </p:spTree>
-    <p:extLst>
-      <p:ext uri="{BB962C8B-B14F-4D97-AF65-F5344CB8AC3E}">
-        <p14:creationId xmlns:p14="http://schemas.microsoft.com/office/powerpoint/2010/main" val="2783168971"/>
-      </p:ext>
-    </p:extLst>
-  </p:cSld>
-  <p:clrMapOvr>
-    <a:masterClrMapping/>
-  </p:clrMapOvr>
-</p:sld>
-</file>
-
-<file path=ppt/slides/slide4.xml><?xml version="1.0" encoding="utf-8"?>
 <p:sld xmlns:a="http://schemas.openxmlformats.org/drawingml/2006/main" xmlns:r="http://schemas.openxmlformats.org/officeDocument/2006/relationships" xmlns:p="http://schemas.openxmlformats.org/presentationml/2006/main">
   <p:cSld>
     <p:spTree>
@@ -7165,7 +6796,7 @@
 </p:sld>
 </file>
 
-<file path=ppt/slides/slide5.xml><?xml version="1.0" encoding="utf-8"?>
+<file path=ppt/slides/slide3.xml><?xml version="1.0" encoding="utf-8"?>
 <p:sld xmlns:a="http://schemas.openxmlformats.org/drawingml/2006/main" xmlns:r="http://schemas.openxmlformats.org/officeDocument/2006/relationships" xmlns:p="http://schemas.openxmlformats.org/presentationml/2006/main">
   <p:cSld>
     <p:spTree>
@@ -7418,7 +7049,7 @@
 </p:sld>
 </file>
 
-<file path=ppt/slides/slide6.xml><?xml version="1.0" encoding="utf-8"?>
+<file path=ppt/slides/slide4.xml><?xml version="1.0" encoding="utf-8"?>
 <p:sld xmlns:a="http://schemas.openxmlformats.org/drawingml/2006/main" xmlns:r="http://schemas.openxmlformats.org/officeDocument/2006/relationships" xmlns:p="http://schemas.openxmlformats.org/presentationml/2006/main">
   <p:cSld>
     <p:spTree>
@@ -7708,7 +7339,7 @@
 </p:sld>
 </file>
 
-<file path=ppt/slides/slide7.xml><?xml version="1.0" encoding="utf-8"?>
+<file path=ppt/slides/slide5.xml><?xml version="1.0" encoding="utf-8"?>
 <p:sld xmlns:a="http://schemas.openxmlformats.org/drawingml/2006/main" xmlns:r="http://schemas.openxmlformats.org/officeDocument/2006/relationships" xmlns:p="http://schemas.openxmlformats.org/presentationml/2006/main">
   <p:cSld>
     <p:spTree>
@@ -7887,7 +7518,7 @@
 </p:sld>
 </file>
 
-<file path=ppt/slides/slide8.xml><?xml version="1.0" encoding="utf-8"?>
+<file path=ppt/slides/slide6.xml><?xml version="1.0" encoding="utf-8"?>
 <p:sld xmlns:a="http://schemas.openxmlformats.org/drawingml/2006/main" xmlns:r="http://schemas.openxmlformats.org/officeDocument/2006/relationships" xmlns:p="http://schemas.openxmlformats.org/presentationml/2006/main">
   <p:cSld>
     <p:spTree>
@@ -8181,7 +7812,7 @@
 </p:sld>
 </file>
 
-<file path=ppt/slides/slide9.xml><?xml version="1.0" encoding="utf-8"?>
+<file path=ppt/slides/slide7.xml><?xml version="1.0" encoding="utf-8"?>
 <p:sld xmlns:a="http://schemas.openxmlformats.org/drawingml/2006/main" xmlns:r="http://schemas.openxmlformats.org/officeDocument/2006/relationships" xmlns:p="http://schemas.openxmlformats.org/presentationml/2006/main">
   <p:cSld>
     <p:spTree>
@@ -8363,6 +7994,130 @@
     <p:extLst>
       <p:ext uri="{BB962C8B-B14F-4D97-AF65-F5344CB8AC3E}">
         <p14:creationId xmlns:p14="http://schemas.microsoft.com/office/powerpoint/2010/main" val="3751777119"/>
+      </p:ext>
+    </p:extLst>
+  </p:cSld>
+  <p:clrMapOvr>
+    <a:masterClrMapping/>
+  </p:clrMapOvr>
+</p:sld>
+</file>
+
+<file path=ppt/slides/slide8.xml><?xml version="1.0" encoding="utf-8"?>
+<p:sld xmlns:a="http://schemas.openxmlformats.org/drawingml/2006/main" xmlns:r="http://schemas.openxmlformats.org/officeDocument/2006/relationships" xmlns:p="http://schemas.openxmlformats.org/presentationml/2006/main">
+  <p:cSld>
+    <p:spTree>
+      <p:nvGrpSpPr>
+        <p:cNvPr id="1" name=""/>
+        <p:cNvGrpSpPr/>
+        <p:nvPr/>
+      </p:nvGrpSpPr>
+      <p:grpSpPr>
+        <a:xfrm>
+          <a:off x="0" y="0"/>
+          <a:ext cx="0" cy="0"/>
+          <a:chOff x="0" y="0"/>
+          <a:chExt cx="0" cy="0"/>
+        </a:xfrm>
+      </p:grpSpPr>
+      <p:sp>
+        <p:nvSpPr>
+          <p:cNvPr id="2" name="Title 1">
+            <a:extLst>
+              <a:ext uri="{FF2B5EF4-FFF2-40B4-BE49-F238E27FC236}">
+                <a16:creationId xmlns:a16="http://schemas.microsoft.com/office/drawing/2014/main" id="{F1744F26-6427-43BD-8C69-3B4A4F107532}"/>
+              </a:ext>
+            </a:extLst>
+          </p:cNvPr>
+          <p:cNvSpPr>
+            <a:spLocks noGrp="1"/>
+          </p:cNvSpPr>
+          <p:nvPr>
+            <p:ph type="ctrTitle"/>
+          </p:nvPr>
+        </p:nvSpPr>
+        <p:spPr/>
+        <p:txBody>
+          <a:bodyPr/>
+          <a:lstStyle/>
+          <a:p>
+            <a:r>
+              <a:rPr lang="en-US" dirty="0"/>
+              <a:t>Thank you</a:t>
+            </a:r>
+            <a:endParaRPr lang="en-GB" dirty="0"/>
+          </a:p>
+        </p:txBody>
+      </p:sp>
+      <p:sp>
+        <p:nvSpPr>
+          <p:cNvPr id="3" name="Subtitle 2">
+            <a:extLst>
+              <a:ext uri="{FF2B5EF4-FFF2-40B4-BE49-F238E27FC236}">
+                <a16:creationId xmlns:a16="http://schemas.microsoft.com/office/drawing/2014/main" id="{A0907073-DF12-4691-8658-B05FE5E77A8D}"/>
+              </a:ext>
+            </a:extLst>
+          </p:cNvPr>
+          <p:cNvSpPr>
+            <a:spLocks noGrp="1"/>
+          </p:cNvSpPr>
+          <p:nvPr>
+            <p:ph type="subTitle" idx="1"/>
+          </p:nvPr>
+        </p:nvSpPr>
+        <p:spPr>
+          <a:xfrm>
+            <a:off x="2679906" y="3956280"/>
+            <a:ext cx="6831673" cy="404614"/>
+          </a:xfrm>
+        </p:spPr>
+        <p:txBody>
+          <a:bodyPr>
+            <a:normAutofit/>
+          </a:bodyPr>
+          <a:lstStyle/>
+          <a:p>
+            <a:r>
+              <a:rPr lang="en-US" sz="2000" dirty="0"/>
+              <a:t>Thoughts, comments, questions welcome. Here or on twitter.</a:t>
+            </a:r>
+            <a:endParaRPr lang="en-GB" sz="2000" dirty="0"/>
+          </a:p>
+        </p:txBody>
+      </p:sp>
+      <p:sp>
+        <p:nvSpPr>
+          <p:cNvPr id="4" name="Footer Placeholder 3">
+            <a:extLst>
+              <a:ext uri="{FF2B5EF4-FFF2-40B4-BE49-F238E27FC236}">
+                <a16:creationId xmlns:a16="http://schemas.microsoft.com/office/drawing/2014/main" id="{A124BEA5-4BA4-4300-8E4B-966278C5B5C9}"/>
+              </a:ext>
+            </a:extLst>
+          </p:cNvPr>
+          <p:cNvSpPr>
+            <a:spLocks noGrp="1"/>
+          </p:cNvSpPr>
+          <p:nvPr>
+            <p:ph type="ftr" sz="quarter" idx="11"/>
+          </p:nvPr>
+        </p:nvSpPr>
+        <p:spPr/>
+        <p:txBody>
+          <a:bodyPr/>
+          <a:lstStyle/>
+          <a:p>
+            <a:r>
+              <a:rPr lang="en-US"/>
+              <a:t>@rubberduckdev</a:t>
+            </a:r>
+            <a:endParaRPr lang="en-US" dirty="0"/>
+          </a:p>
+        </p:txBody>
+      </p:sp>
+    </p:spTree>
+    <p:extLst>
+      <p:ext uri="{BB962C8B-B14F-4D97-AF65-F5344CB8AC3E}">
+        <p14:creationId xmlns:p14="http://schemas.microsoft.com/office/powerpoint/2010/main" val="1007846012"/>
       </p:ext>
     </p:extLst>
   </p:cSld>

</xml_diff>